<commit_message>
chg: corrected LCC IV CORPS Conops phase 1 + added F-16 presets
</commit_message>
<xml_diff>
--- a/UNDER DEVELOPMENT/OPAR LCC IV CORPS CONCEPT OF OPERATIONS PHASE 1.pptx
+++ b/UNDER DEVELOPMENT/OPAR LCC IV CORPS CONCEPT OF OPERATIONS PHASE 1.pptx
@@ -196,7 +196,7 @@
             <a:fld id="{40637A30-8EE1-4060-9976-8832FC89EE34}" type="datetimeFigureOut">
               <a:rPr lang="nb-NO" smtClean="0"/>
               <a:pPr/>
-              <a:t>04.09.2020</a:t>
+              <a:t>10.09.2020</a:t>
             </a:fld>
             <a:endParaRPr lang="nb-NO"/>
           </a:p>
@@ -367,7 +367,7 @@
     </p:spTree>
     <p:extLst>
       <p:ext uri="{BB962C8B-B14F-4D97-AF65-F5344CB8AC3E}">
-        <p14:creationId xmlns:p14="http://schemas.microsoft.com/office/powerpoint/2010/main" xmlns="" val="2256331300"/>
+        <p14:creationId xmlns="" xmlns:p14="http://schemas.microsoft.com/office/powerpoint/2010/main" val="2256331300"/>
       </p:ext>
     </p:extLst>
   </p:cSld>
@@ -3816,10 +3816,6 @@
               </a:rPr>
               <a:t>IV CORPS</a:t>
             </a:r>
-            <a:endParaRPr lang="nb-NO" sz="3200" b="1" dirty="0" smtClean="0">
-              <a:latin typeface="Arial Black" pitchFamily="34" charset="0"/>
-              <a:ea typeface="MS Mincho" pitchFamily="49" charset="-128"/>
-            </a:endParaRPr>
           </a:p>
           <a:p>
             <a:pPr algn="ctr"/>
@@ -3915,14 +3911,21 @@
                 <a:latin typeface="Arial" pitchFamily="34" charset="0"/>
                 <a:cs typeface="Arial" pitchFamily="34" charset="0"/>
               </a:rPr>
-              <a:t>Published: </a:t>
-            </a:r>
-            <a:r>
-              <a:rPr lang="en-US" sz="1400" dirty="0" smtClean="0">
+              <a:t>Published</a:t>
+            </a:r>
+            <a:r>
+              <a:rPr lang="en-US" sz="1400" smtClean="0">
                 <a:latin typeface="Arial" pitchFamily="34" charset="0"/>
                 <a:cs typeface="Arial" pitchFamily="34" charset="0"/>
               </a:rPr>
-              <a:t>2020.04-09</a:t>
+              <a:t>: </a:t>
+            </a:r>
+            <a:r>
+              <a:rPr lang="en-US" sz="1400" smtClean="0">
+                <a:latin typeface="Arial" pitchFamily="34" charset="0"/>
+                <a:cs typeface="Arial" pitchFamily="34" charset="0"/>
+              </a:rPr>
+              <a:t>2020-09-10</a:t>
             </a:r>
             <a:endParaRPr lang="en-US" sz="1400" dirty="0">
               <a:latin typeface="Arial" pitchFamily="34" charset="0"/>
@@ -3966,7 +3969,7 @@
                 <a:latin typeface="Arial" pitchFamily="34" charset="0"/>
                 <a:cs typeface="Arial" pitchFamily="34" charset="0"/>
               </a:rPr>
-              <a:t>1.0</a:t>
+              <a:t>1.1</a:t>
             </a:r>
             <a:endParaRPr lang="en-US" sz="1400" dirty="0">
               <a:latin typeface="Arial" pitchFamily="34" charset="0"/>
@@ -7142,7 +7145,7 @@
                   <a:schemeClr val="tx1"/>
                 </a:solidFill>
               </a:rPr>
-              <a:t>12</a:t>
+              <a:t>11</a:t>
             </a:r>
             <a:r>
               <a:rPr lang="en-US" sz="1000" baseline="30000" dirty="0" smtClean="0">
@@ -7158,7 +7161,15 @@
                   <a:schemeClr val="tx1"/>
                 </a:solidFill>
               </a:rPr>
-              <a:t> Motorized Division</a:t>
+              <a:t> Mechanized </a:t>
+            </a:r>
+            <a:r>
+              <a:rPr lang="en-US" sz="1000" dirty="0" smtClean="0">
+                <a:solidFill>
+                  <a:schemeClr val="tx1"/>
+                </a:solidFill>
+              </a:rPr>
+              <a:t>Division</a:t>
             </a:r>
             <a:endParaRPr lang="en-US" sz="1000" dirty="0">
               <a:solidFill>
@@ -7270,7 +7281,7 @@
                   <a:schemeClr val="tx1"/>
                 </a:solidFill>
               </a:rPr>
-              <a:t>11</a:t>
+              <a:t>12</a:t>
             </a:r>
             <a:r>
               <a:rPr lang="en-US" sz="1000" baseline="30000" dirty="0" smtClean="0">
@@ -7286,7 +7297,15 @@
                   <a:schemeClr val="tx1"/>
                 </a:solidFill>
               </a:rPr>
-              <a:t> Mechanized Division</a:t>
+              <a:t> Motorized </a:t>
+            </a:r>
+            <a:r>
+              <a:rPr lang="en-US" sz="1000" dirty="0" smtClean="0">
+                <a:solidFill>
+                  <a:schemeClr val="tx1"/>
+                </a:solidFill>
+              </a:rPr>
+              <a:t>Division</a:t>
             </a:r>
             <a:endParaRPr lang="en-US" sz="1000" dirty="0">
               <a:solidFill>
@@ -11164,15 +11183,7 @@
             </a:r>
             <a:r>
               <a:rPr lang="en-US" sz="1200" dirty="0" smtClean="0"/>
-              <a:t> Armored Division: Quick </a:t>
-            </a:r>
-            <a:r>
-              <a:rPr lang="en-US" sz="1200" dirty="0" smtClean="0"/>
-              <a:t>o</a:t>
-            </a:r>
-            <a:r>
-              <a:rPr lang="en-US" sz="1200" dirty="0" smtClean="0"/>
-              <a:t>ffensive operation to seize objective A and B</a:t>
+              <a:t> Armored Division: Quick offensive operation to seize objective A and B</a:t>
             </a:r>
           </a:p>
           <a:p>

</xml_diff>